<commit_message>
fix: badge alignment in template file
</commit_message>
<xml_diff>
--- a/Blazor/wwwroot/downloads/Name Badges Template.pptx
+++ b/Blazor/wwwroot/downloads/Name Badges Template.pptx
@@ -252,7 +252,7 @@
           <a:p>
             <a:fld id="{3E2D0CB4-E636-0646-948E-4D958A250AA8}" type="datetimeFigureOut">
               <a:rPr lang="en-US" smtClean="0"/>
-              <a:t>7/19/2022</a:t>
+              <a:t>9/27/22</a:t>
             </a:fld>
             <a:endParaRPr lang="en-US"/>
           </a:p>
@@ -420,7 +420,7 @@
           <a:p>
             <a:fld id="{3E2D0CB4-E636-0646-948E-4D958A250AA8}" type="datetimeFigureOut">
               <a:rPr lang="en-US" smtClean="0"/>
-              <a:t>7/19/2022</a:t>
+              <a:t>9/27/22</a:t>
             </a:fld>
             <a:endParaRPr lang="en-US"/>
           </a:p>
@@ -598,7 +598,7 @@
           <a:p>
             <a:fld id="{3E2D0CB4-E636-0646-948E-4D958A250AA8}" type="datetimeFigureOut">
               <a:rPr lang="en-US" smtClean="0"/>
-              <a:t>7/19/2022</a:t>
+              <a:t>9/27/22</a:t>
             </a:fld>
             <a:endParaRPr lang="en-US"/>
           </a:p>
@@ -766,7 +766,7 @@
           <a:p>
             <a:fld id="{3E2D0CB4-E636-0646-948E-4D958A250AA8}" type="datetimeFigureOut">
               <a:rPr lang="en-US" smtClean="0"/>
-              <a:t>7/19/2022</a:t>
+              <a:t>9/27/22</a:t>
             </a:fld>
             <a:endParaRPr lang="en-US"/>
           </a:p>
@@ -1009,7 +1009,7 @@
           <a:p>
             <a:fld id="{3E2D0CB4-E636-0646-948E-4D958A250AA8}" type="datetimeFigureOut">
               <a:rPr lang="en-US" smtClean="0"/>
-              <a:t>7/19/2022</a:t>
+              <a:t>9/27/22</a:t>
             </a:fld>
             <a:endParaRPr lang="en-US"/>
           </a:p>
@@ -1238,7 +1238,7 @@
           <a:p>
             <a:fld id="{3E2D0CB4-E636-0646-948E-4D958A250AA8}" type="datetimeFigureOut">
               <a:rPr lang="en-US" smtClean="0"/>
-              <a:t>7/19/2022</a:t>
+              <a:t>9/27/22</a:t>
             </a:fld>
             <a:endParaRPr lang="en-US"/>
           </a:p>
@@ -1602,7 +1602,7 @@
           <a:p>
             <a:fld id="{3E2D0CB4-E636-0646-948E-4D958A250AA8}" type="datetimeFigureOut">
               <a:rPr lang="en-US" smtClean="0"/>
-              <a:t>7/19/2022</a:t>
+              <a:t>9/27/22</a:t>
             </a:fld>
             <a:endParaRPr lang="en-US"/>
           </a:p>
@@ -1719,7 +1719,7 @@
           <a:p>
             <a:fld id="{3E2D0CB4-E636-0646-948E-4D958A250AA8}" type="datetimeFigureOut">
               <a:rPr lang="en-US" smtClean="0"/>
-              <a:t>7/19/2022</a:t>
+              <a:t>9/27/22</a:t>
             </a:fld>
             <a:endParaRPr lang="en-US"/>
           </a:p>
@@ -1814,7 +1814,7 @@
           <a:p>
             <a:fld id="{3E2D0CB4-E636-0646-948E-4D958A250AA8}" type="datetimeFigureOut">
               <a:rPr lang="en-US" smtClean="0"/>
-              <a:t>7/19/2022</a:t>
+              <a:t>9/27/22</a:t>
             </a:fld>
             <a:endParaRPr lang="en-US"/>
           </a:p>
@@ -2089,7 +2089,7 @@
           <a:p>
             <a:fld id="{3E2D0CB4-E636-0646-948E-4D958A250AA8}" type="datetimeFigureOut">
               <a:rPr lang="en-US" smtClean="0"/>
-              <a:t>7/19/2022</a:t>
+              <a:t>9/27/22</a:t>
             </a:fld>
             <a:endParaRPr lang="en-US"/>
           </a:p>
@@ -2344,7 +2344,7 @@
           <a:p>
             <a:fld id="{3E2D0CB4-E636-0646-948E-4D958A250AA8}" type="datetimeFigureOut">
               <a:rPr lang="en-US" smtClean="0"/>
-              <a:t>7/19/2022</a:t>
+              <a:t>9/27/22</a:t>
             </a:fld>
             <a:endParaRPr lang="en-US"/>
           </a:p>
@@ -2555,7 +2555,7 @@
           <a:p>
             <a:fld id="{3E2D0CB4-E636-0646-948E-4D958A250AA8}" type="datetimeFigureOut">
               <a:rPr lang="en-US" smtClean="0"/>
-              <a:t>7/19/2022</a:t>
+              <a:t>9/27/22</a:t>
             </a:fld>
             <a:endParaRPr lang="en-US"/>
           </a:p>
@@ -2974,7 +2974,7 @@
         </p:nvSpPr>
         <p:spPr>
           <a:xfrm>
-            <a:off x="411628" y="1049429"/>
+            <a:off x="470289" y="1049429"/>
             <a:ext cx="2879729" cy="923330"/>
           </a:xfrm>
           <a:prstGeom prst="rect">
@@ -3023,7 +3023,7 @@
         </p:nvSpPr>
         <p:spPr>
           <a:xfrm>
-            <a:off x="3447767" y="1043584"/>
+            <a:off x="3466263" y="1049429"/>
             <a:ext cx="2879729" cy="923330"/>
           </a:xfrm>
           <a:prstGeom prst="rect">
@@ -3072,7 +3072,7 @@
         </p:nvSpPr>
         <p:spPr>
           <a:xfrm>
-            <a:off x="511696" y="3177564"/>
+            <a:off x="470289" y="3405493"/>
             <a:ext cx="2879729" cy="923330"/>
           </a:xfrm>
           <a:prstGeom prst="rect">
@@ -3121,7 +3121,7 @@
         </p:nvSpPr>
         <p:spPr>
           <a:xfrm>
-            <a:off x="3429000" y="3177564"/>
+            <a:off x="3466263" y="3405493"/>
             <a:ext cx="2879729" cy="923330"/>
           </a:xfrm>
           <a:prstGeom prst="rect">
@@ -3170,7 +3170,7 @@
         </p:nvCxnSpPr>
         <p:spPr>
           <a:xfrm>
-            <a:off x="3391425" y="192505"/>
+            <a:off x="3439060" y="172452"/>
             <a:ext cx="0" cy="9561095"/>
           </a:xfrm>
           <a:prstGeom prst="line">
@@ -3215,7 +3215,7 @@
         </p:nvCxnSpPr>
         <p:spPr>
           <a:xfrm flipH="1">
-            <a:off x="-36272" y="2606841"/>
+            <a:off x="-23695" y="2552677"/>
             <a:ext cx="7108133" cy="0"/>
           </a:xfrm>
           <a:prstGeom prst="line">
@@ -3260,7 +3260,7 @@
         </p:nvCxnSpPr>
         <p:spPr>
           <a:xfrm flipH="1">
-            <a:off x="-162642" y="4691495"/>
+            <a:off x="-162642" y="4957495"/>
             <a:ext cx="7108133" cy="0"/>
           </a:xfrm>
           <a:prstGeom prst="line">
@@ -3305,7 +3305,7 @@
         </p:nvCxnSpPr>
         <p:spPr>
           <a:xfrm flipH="1">
-            <a:off x="-250133" y="6949950"/>
+            <a:off x="-250133" y="7362495"/>
             <a:ext cx="7108133" cy="0"/>
           </a:xfrm>
           <a:prstGeom prst="line">
@@ -3348,7 +3348,7 @@
         </p:nvCxnSpPr>
         <p:spPr>
           <a:xfrm>
-            <a:off x="6392950" y="172452"/>
+            <a:off x="6392950" y="210552"/>
             <a:ext cx="0" cy="9561095"/>
           </a:xfrm>
           <a:prstGeom prst="line">
@@ -3391,7 +3391,7 @@
         </p:nvCxnSpPr>
         <p:spPr>
           <a:xfrm>
-            <a:off x="479783" y="172452"/>
+            <a:off x="491868" y="200345"/>
             <a:ext cx="0" cy="9561095"/>
           </a:xfrm>
           <a:prstGeom prst="line">
@@ -3436,7 +3436,7 @@
         </p:nvCxnSpPr>
         <p:spPr>
           <a:xfrm flipH="1">
-            <a:off x="-162642" y="8963234"/>
+            <a:off x="-172337" y="9774254"/>
             <a:ext cx="7108133" cy="0"/>
           </a:xfrm>
           <a:prstGeom prst="line">
@@ -3481,7 +3481,7 @@
         </p:nvCxnSpPr>
         <p:spPr>
           <a:xfrm flipH="1">
-            <a:off x="-250133" y="558204"/>
+            <a:off x="-262710" y="172452"/>
             <a:ext cx="7108133" cy="0"/>
           </a:xfrm>
           <a:prstGeom prst="line">
@@ -3524,7 +3524,7 @@
         </p:nvSpPr>
         <p:spPr>
           <a:xfrm>
-            <a:off x="502001" y="5422676"/>
+            <a:off x="470289" y="5761557"/>
             <a:ext cx="2879729" cy="923330"/>
           </a:xfrm>
           <a:prstGeom prst="rect">
@@ -3573,7 +3573,7 @@
         </p:nvSpPr>
         <p:spPr>
           <a:xfrm>
-            <a:off x="3419305" y="5422676"/>
+            <a:off x="3466263" y="5761557"/>
             <a:ext cx="2879729" cy="923330"/>
           </a:xfrm>
           <a:prstGeom prst="rect">
@@ -3622,7 +3622,7 @@
         </p:nvSpPr>
         <p:spPr>
           <a:xfrm>
-            <a:off x="502001" y="7505489"/>
+            <a:off x="470289" y="8117620"/>
             <a:ext cx="2879729" cy="923330"/>
           </a:xfrm>
           <a:prstGeom prst="rect">
@@ -3671,7 +3671,7 @@
         </p:nvSpPr>
         <p:spPr>
           <a:xfrm>
-            <a:off x="3419305" y="7505489"/>
+            <a:off x="3466263" y="8117620"/>
             <a:ext cx="2879729" cy="923330"/>
           </a:xfrm>
           <a:prstGeom prst="rect">
@@ -3981,26 +3981,6 @@
 </file>
 
 <file path=customXml/item1.xml><?xml version="1.0" encoding="utf-8"?>
-<p:properties xmlns:p="http://schemas.microsoft.com/office/2006/metadata/properties" xmlns:xsi="http://www.w3.org/2001/XMLSchema-instance" xmlns:pc="http://schemas.microsoft.com/office/infopath/2007/PartnerControls">
-  <documentManagement>
-    <TaxCatchAll xmlns="f4c83991-f6b5-4493-a486-826feaffa8ba" xsi:nil="true"/>
-    <lcf76f155ced4ddcb4097134ff3c332f xmlns="760e5ee4-e021-4e47-b1b8-05fbae9c517b">
-      <Terms xmlns="http://schemas.microsoft.com/office/infopath/2007/PartnerControls"/>
-    </lcf76f155ced4ddcb4097134ff3c332f>
-  </documentManagement>
-</p:properties>
-</file>
-
-<file path=customXml/item2.xml><?xml version="1.0" encoding="utf-8"?>
-<?mso-contentType ?>
-<FormTemplates xmlns="http://schemas.microsoft.com/sharepoint/v3/contenttype/forms">
-  <Display>DocumentLibraryForm</Display>
-  <Edit>DocumentLibraryForm</Edit>
-  <New>DocumentLibraryForm</New>
-</FormTemplates>
-</file>
-
-<file path=customXml/item3.xml><?xml version="1.0" encoding="utf-8"?>
 <ct:contentTypeSchema xmlns:ct="http://schemas.microsoft.com/office/2006/metadata/contentType" xmlns:ma="http://schemas.microsoft.com/office/2006/metadata/properties/metaAttributes" ct:_="" ma:_="" ma:contentTypeName="Document" ma:contentTypeID="0x010100DF9B0A0B2A0B3A4FB04770AC74B3F62B" ma:contentTypeVersion="17" ma:contentTypeDescription="Create a new document." ma:contentTypeScope="" ma:versionID="75b484d6984eead11412cb6edfc542d1">
   <xsd:schema xmlns:xsd="http://www.w3.org/2001/XMLSchema" xmlns:xs="http://www.w3.org/2001/XMLSchema" xmlns:p="http://schemas.microsoft.com/office/2006/metadata/properties" xmlns:ns2="760e5ee4-e021-4e47-b1b8-05fbae9c517b" xmlns:ns3="f4c83991-f6b5-4493-a486-826feaffa8ba" targetNamespace="http://schemas.microsoft.com/office/2006/metadata/properties" ma:root="true" ma:fieldsID="e8c1aaa0f6a9d8156a7de86097b30528" ns2:_="" ns3:_="">
     <xsd:import namespace="760e5ee4-e021-4e47-b1b8-05fbae9c517b"/>
@@ -4243,32 +4223,27 @@
 </ct:contentTypeSchema>
 </file>
 
-<file path=customXml/itemProps1.xml><?xml version="1.0" encoding="utf-8"?>
-<ds:datastoreItem xmlns:ds="http://schemas.openxmlformats.org/officeDocument/2006/customXml" ds:itemID="{DFA3D9F6-A4D4-460A-9FB5-D3AD526600CF}">
-  <ds:schemaRefs>
-    <ds:schemaRef ds:uri="http://schemas.microsoft.com/office/2006/documentManagement/types"/>
-    <ds:schemaRef ds:uri="760e5ee4-e021-4e47-b1b8-05fbae9c517b"/>
-    <ds:schemaRef ds:uri="http://purl.org/dc/terms/"/>
-    <ds:schemaRef ds:uri="http://purl.org/dc/dcmitype/"/>
-    <ds:schemaRef ds:uri="http://schemas.microsoft.com/office/infopath/2007/PartnerControls"/>
-    <ds:schemaRef ds:uri="http://purl.org/dc/elements/1.1/"/>
-    <ds:schemaRef ds:uri="http://schemas.microsoft.com/office/2006/metadata/properties"/>
-    <ds:schemaRef ds:uri="http://schemas.openxmlformats.org/package/2006/metadata/core-properties"/>
-    <ds:schemaRef ds:uri="f4c83991-f6b5-4493-a486-826feaffa8ba"/>
-    <ds:schemaRef ds:uri="http://www.w3.org/XML/1998/namespace"/>
-  </ds:schemaRefs>
-</ds:datastoreItem>
+<file path=customXml/item2.xml><?xml version="1.0" encoding="utf-8"?>
+<?mso-contentType ?>
+<FormTemplates xmlns="http://schemas.microsoft.com/sharepoint/v3/contenttype/forms">
+  <Display>DocumentLibraryForm</Display>
+  <Edit>DocumentLibraryForm</Edit>
+  <New>DocumentLibraryForm</New>
+</FormTemplates>
 </file>
 
-<file path=customXml/itemProps2.xml><?xml version="1.0" encoding="utf-8"?>
-<ds:datastoreItem xmlns:ds="http://schemas.openxmlformats.org/officeDocument/2006/customXml" ds:itemID="{4AE3E517-0D3E-4733-898C-FB2F00A91882}">
-  <ds:schemaRefs>
-    <ds:schemaRef ds:uri="http://schemas.microsoft.com/sharepoint/v3/contenttype/forms"/>
-  </ds:schemaRefs>
-</ds:datastoreItem>
+<file path=customXml/item3.xml><?xml version="1.0" encoding="utf-8"?>
+<p:properties xmlns:p="http://schemas.microsoft.com/office/2006/metadata/properties" xmlns:xsi="http://www.w3.org/2001/XMLSchema-instance" xmlns:pc="http://schemas.microsoft.com/office/infopath/2007/PartnerControls">
+  <documentManagement>
+    <TaxCatchAll xmlns="f4c83991-f6b5-4493-a486-826feaffa8ba" xsi:nil="true"/>
+    <lcf76f155ced4ddcb4097134ff3c332f xmlns="760e5ee4-e021-4e47-b1b8-05fbae9c517b">
+      <Terms xmlns="http://schemas.microsoft.com/office/infopath/2007/PartnerControls"/>
+    </lcf76f155ced4ddcb4097134ff3c332f>
+  </documentManagement>
+</p:properties>
 </file>
 
-<file path=customXml/itemProps3.xml><?xml version="1.0" encoding="utf-8"?>
+<file path=customXml/itemProps1.xml><?xml version="1.0" encoding="utf-8"?>
 <ds:datastoreItem xmlns:ds="http://schemas.openxmlformats.org/officeDocument/2006/customXml" ds:itemID="{92EE6562-E76C-4A7B-AEE7-EFCF6074AAAB}">
   <ds:schemaRefs>
     <ds:schemaRef ds:uri="http://schemas.microsoft.com/office/2006/metadata/contentType"/>
@@ -4285,4 +4260,29 @@
     <ds:schemaRef ds:uri="http://schemas.microsoft.com/internal/obd"/>
   </ds:schemaRefs>
 </ds:datastoreItem>
+</file>
+
+<file path=customXml/itemProps2.xml><?xml version="1.0" encoding="utf-8"?>
+<ds:datastoreItem xmlns:ds="http://schemas.openxmlformats.org/officeDocument/2006/customXml" ds:itemID="{4AE3E517-0D3E-4733-898C-FB2F00A91882}">
+  <ds:schemaRefs>
+    <ds:schemaRef ds:uri="http://schemas.microsoft.com/sharepoint/v3/contenttype/forms"/>
+  </ds:schemaRefs>
+</ds:datastoreItem>
+</file>
+
+<file path=customXml/itemProps3.xml><?xml version="1.0" encoding="utf-8"?>
+<ds:datastoreItem xmlns:ds="http://schemas.openxmlformats.org/officeDocument/2006/customXml" ds:itemID="{DFA3D9F6-A4D4-460A-9FB5-D3AD526600CF}">
+  <ds:schemaRefs>
+    <ds:schemaRef ds:uri="http://schemas.microsoft.com/office/2006/documentManagement/types"/>
+    <ds:schemaRef ds:uri="760e5ee4-e021-4e47-b1b8-05fbae9c517b"/>
+    <ds:schemaRef ds:uri="http://purl.org/dc/terms/"/>
+    <ds:schemaRef ds:uri="http://purl.org/dc/dcmitype/"/>
+    <ds:schemaRef ds:uri="http://schemas.microsoft.com/office/infopath/2007/PartnerControls"/>
+    <ds:schemaRef ds:uri="http://purl.org/dc/elements/1.1/"/>
+    <ds:schemaRef ds:uri="http://schemas.microsoft.com/office/2006/metadata/properties"/>
+    <ds:schemaRef ds:uri="http://schemas.openxmlformats.org/package/2006/metadata/core-properties"/>
+    <ds:schemaRef ds:uri="f4c83991-f6b5-4493-a486-826feaffa8ba"/>
+    <ds:schemaRef ds:uri="http://www.w3.org/XML/1998/namespace"/>
+  </ds:schemaRefs>
+</ds:datastoreItem>
 </file>
</xml_diff>